<commit_message>
Updated workflow for using Git Hub, fork and pull request in Gitforsmarties.pptx
</commit_message>
<xml_diff>
--- a/doc/Gitforsmarties.pptx
+++ b/doc/Gitforsmarties.pptx
@@ -298,7 +298,7 @@
           <a:p>
             <a:fld id="{3EA844A9-CFBD-4074-B5B6-8474B686FD52}" type="datetimeFigureOut">
               <a:rPr lang="nn-NO" smtClean="0"/>
-              <a:t>12.04.2013</a:t>
+              <a:t>13.05.2013</a:t>
             </a:fld>
             <a:endParaRPr lang="nn-NO"/>
           </a:p>
@@ -468,7 +468,7 @@
           <a:p>
             <a:fld id="{3EA844A9-CFBD-4074-B5B6-8474B686FD52}" type="datetimeFigureOut">
               <a:rPr lang="nn-NO" smtClean="0"/>
-              <a:t>12.04.2013</a:t>
+              <a:t>13.05.2013</a:t>
             </a:fld>
             <a:endParaRPr lang="nn-NO"/>
           </a:p>
@@ -648,7 +648,7 @@
           <a:p>
             <a:fld id="{3EA844A9-CFBD-4074-B5B6-8474B686FD52}" type="datetimeFigureOut">
               <a:rPr lang="nn-NO" smtClean="0"/>
-              <a:t>12.04.2013</a:t>
+              <a:t>13.05.2013</a:t>
             </a:fld>
             <a:endParaRPr lang="nn-NO"/>
           </a:p>
@@ -818,7 +818,7 @@
           <a:p>
             <a:fld id="{3EA844A9-CFBD-4074-B5B6-8474B686FD52}" type="datetimeFigureOut">
               <a:rPr lang="nn-NO" smtClean="0"/>
-              <a:t>12.04.2013</a:t>
+              <a:t>13.05.2013</a:t>
             </a:fld>
             <a:endParaRPr lang="nn-NO"/>
           </a:p>
@@ -1064,7 +1064,7 @@
           <a:p>
             <a:fld id="{3EA844A9-CFBD-4074-B5B6-8474B686FD52}" type="datetimeFigureOut">
               <a:rPr lang="nn-NO" smtClean="0"/>
-              <a:t>12.04.2013</a:t>
+              <a:t>13.05.2013</a:t>
             </a:fld>
             <a:endParaRPr lang="nn-NO"/>
           </a:p>
@@ -1352,7 +1352,7 @@
           <a:p>
             <a:fld id="{3EA844A9-CFBD-4074-B5B6-8474B686FD52}" type="datetimeFigureOut">
               <a:rPr lang="nn-NO" smtClean="0"/>
-              <a:t>12.04.2013</a:t>
+              <a:t>13.05.2013</a:t>
             </a:fld>
             <a:endParaRPr lang="nn-NO"/>
           </a:p>
@@ -1774,7 +1774,7 @@
           <a:p>
             <a:fld id="{3EA844A9-CFBD-4074-B5B6-8474B686FD52}" type="datetimeFigureOut">
               <a:rPr lang="nn-NO" smtClean="0"/>
-              <a:t>12.04.2013</a:t>
+              <a:t>13.05.2013</a:t>
             </a:fld>
             <a:endParaRPr lang="nn-NO"/>
           </a:p>
@@ -1892,7 +1892,7 @@
           <a:p>
             <a:fld id="{3EA844A9-CFBD-4074-B5B6-8474B686FD52}" type="datetimeFigureOut">
               <a:rPr lang="nn-NO" smtClean="0"/>
-              <a:t>12.04.2013</a:t>
+              <a:t>13.05.2013</a:t>
             </a:fld>
             <a:endParaRPr lang="nn-NO"/>
           </a:p>
@@ -1987,7 +1987,7 @@
           <a:p>
             <a:fld id="{3EA844A9-CFBD-4074-B5B6-8474B686FD52}" type="datetimeFigureOut">
               <a:rPr lang="nn-NO" smtClean="0"/>
-              <a:t>12.04.2013</a:t>
+              <a:t>13.05.2013</a:t>
             </a:fld>
             <a:endParaRPr lang="nn-NO"/>
           </a:p>
@@ -2264,7 +2264,7 @@
           <a:p>
             <a:fld id="{3EA844A9-CFBD-4074-B5B6-8474B686FD52}" type="datetimeFigureOut">
               <a:rPr lang="nn-NO" smtClean="0"/>
-              <a:t>12.04.2013</a:t>
+              <a:t>13.05.2013</a:t>
             </a:fld>
             <a:endParaRPr lang="nn-NO"/>
           </a:p>
@@ -2517,7 +2517,7 @@
           <a:p>
             <a:fld id="{3EA844A9-CFBD-4074-B5B6-8474B686FD52}" type="datetimeFigureOut">
               <a:rPr lang="nn-NO" smtClean="0"/>
-              <a:t>12.04.2013</a:t>
+              <a:t>13.05.2013</a:t>
             </a:fld>
             <a:endParaRPr lang="nn-NO"/>
           </a:p>
@@ -2730,7 +2730,7 @@
           <a:p>
             <a:fld id="{3EA844A9-CFBD-4074-B5B6-8474B686FD52}" type="datetimeFigureOut">
               <a:rPr lang="nn-NO" smtClean="0"/>
-              <a:t>12.04.2013</a:t>
+              <a:t>13.05.2013</a:t>
             </a:fld>
             <a:endParaRPr lang="nn-NO"/>
           </a:p>
@@ -3760,7 +3760,7 @@
         <p:spPr/>
         <p:txBody>
           <a:bodyPr>
-            <a:normAutofit fontScale="77500" lnSpcReduction="20000"/>
+            <a:normAutofit fontScale="62500" lnSpcReduction="20000"/>
           </a:bodyPr>
           <a:lstStyle/>
           <a:p>
@@ -3770,7 +3770,7 @@
             </a:pPr>
             <a:r>
               <a:rPr lang="nn-NO" dirty="0" smtClean="0"/>
-              <a:t>Klon </a:t>
+              <a:t>Fork CRAVA/</a:t>
             </a:r>
             <a:r>
               <a:rPr lang="nn-NO" dirty="0" err="1" smtClean="0"/>
@@ -3778,25 +3778,13 @@
             </a:r>
             <a:r>
               <a:rPr lang="nn-NO" dirty="0" smtClean="0"/>
-              <a:t> frå code.nr.no</a:t>
-            </a:r>
-            <a:r>
-              <a:rPr lang="en-GB" dirty="0" smtClean="0"/>
-              <a:t>/</a:t>
-            </a:r>
-            <a:r>
-              <a:rPr lang="en-GB" dirty="0" err="1" smtClean="0"/>
-              <a:t>scm</a:t>
-            </a:r>
-            <a:r>
-              <a:rPr lang="en-GB" dirty="0" smtClean="0"/>
-              <a:t>/git/</a:t>
-            </a:r>
-            <a:r>
-              <a:rPr lang="en-GB" dirty="0" err="1" smtClean="0"/>
-              <a:t>crava</a:t>
-            </a:r>
-            <a:endParaRPr lang="en-GB" dirty="0" smtClean="0"/>
+              <a:t> til din bruker på </a:t>
+            </a:r>
+            <a:r>
+              <a:rPr lang="nn-NO" dirty="0" err="1" smtClean="0"/>
+              <a:t>GitHub</a:t>
+            </a:r>
+            <a:endParaRPr lang="nn-NO" dirty="0" smtClean="0"/>
           </a:p>
           <a:p>
             <a:pPr marL="514350" indent="-514350">
@@ -3804,45 +3792,36 @@
               <a:buAutoNum type="arabicPeriod"/>
             </a:pPr>
             <a:r>
-              <a:rPr lang="en-GB" dirty="0" smtClean="0"/>
-              <a:t>Lag </a:t>
-            </a:r>
-            <a:r>
-              <a:rPr lang="en-GB" dirty="0" err="1" smtClean="0"/>
-              <a:t>ein</a:t>
-            </a:r>
-            <a:r>
-              <a:rPr lang="en-GB" dirty="0" smtClean="0"/>
-              <a:t> branch for den </a:t>
-            </a:r>
-            <a:r>
-              <a:rPr lang="en-GB" dirty="0" err="1" smtClean="0"/>
-              <a:t>featuren</a:t>
-            </a:r>
-            <a:r>
-              <a:rPr lang="en-GB" dirty="0" smtClean="0"/>
-              <a:t> du </a:t>
-            </a:r>
-            <a:r>
-              <a:rPr lang="en-GB" dirty="0" err="1" smtClean="0"/>
-              <a:t>jobbar</a:t>
-            </a:r>
-            <a:r>
-              <a:rPr lang="en-GB" dirty="0" smtClean="0"/>
-              <a:t> med. Hugs </a:t>
-            </a:r>
-            <a:r>
-              <a:rPr lang="nn-NO" dirty="0" smtClean="0"/>
-              <a:t>å byta til denne </a:t>
-            </a:r>
-            <a:r>
-              <a:rPr lang="nn-NO" dirty="0" err="1" smtClean="0"/>
-              <a:t>branchen</a:t>
-            </a:r>
-            <a:r>
-              <a:rPr lang="nn-NO" dirty="0" smtClean="0"/>
-              <a:t>.</a:t>
-            </a:r>
+              <a:rPr lang="nn-NO" dirty="0" smtClean="0"/>
+              <a:t>Klon </a:t>
+            </a:r>
+            <a:r>
+              <a:rPr lang="nn-NO" dirty="0" err="1" smtClean="0"/>
+              <a:t>crava</a:t>
+            </a:r>
+            <a:r>
+              <a:rPr lang="nn-NO" dirty="0" smtClean="0"/>
+              <a:t> frå </a:t>
+            </a:r>
+            <a:r>
+              <a:rPr lang="nn-NO" dirty="0">
+                <a:hlinkClick r:id="rId2"/>
+              </a:rPr>
+              <a:t>https://</a:t>
+            </a:r>
+            <a:r>
+              <a:rPr lang="nn-NO" dirty="0" smtClean="0">
+                <a:hlinkClick r:id="rId2"/>
+              </a:rPr>
+              <a:t>github.com/[din bruker]/</a:t>
+            </a:r>
+            <a:r>
+              <a:rPr lang="nn-NO" dirty="0" err="1" smtClean="0">
+                <a:hlinkClick r:id="rId2"/>
+              </a:rPr>
+              <a:t>crava.git</a:t>
+            </a:r>
+            <a:endParaRPr lang="nn-NO" dirty="0" smtClean="0"/>
           </a:p>
           <a:p>
             <a:pPr marL="514350" indent="-514350">
@@ -3850,16 +3829,44 @@
               <a:buAutoNum type="arabicPeriod"/>
             </a:pPr>
             <a:r>
-              <a:rPr lang="nn-NO" dirty="0" smtClean="0"/>
-              <a:t>Jobb i veg. Du kan no ta </a:t>
-            </a:r>
-            <a:r>
-              <a:rPr lang="nn-NO" dirty="0" err="1" smtClean="0"/>
-              <a:t>commit</a:t>
-            </a:r>
-            <a:r>
-              <a:rPr lang="nn-NO" dirty="0" smtClean="0"/>
-              <a:t> så ofte du vil, sidan du berre gjer dette lokalt hos deg.</a:t>
+              <a:rPr lang="en-GB" dirty="0" smtClean="0"/>
+              <a:t>Lag </a:t>
+            </a:r>
+            <a:r>
+              <a:rPr lang="en-GB" dirty="0" err="1" smtClean="0"/>
+              <a:t>ein</a:t>
+            </a:r>
+            <a:r>
+              <a:rPr lang="en-GB" dirty="0" smtClean="0"/>
+              <a:t> branch for den </a:t>
+            </a:r>
+            <a:r>
+              <a:rPr lang="en-GB" dirty="0" err="1" smtClean="0"/>
+              <a:t>featuren</a:t>
+            </a:r>
+            <a:r>
+              <a:rPr lang="en-GB" dirty="0" smtClean="0"/>
+              <a:t> du </a:t>
+            </a:r>
+            <a:r>
+              <a:rPr lang="en-GB" dirty="0" err="1" smtClean="0"/>
+              <a:t>jobbar</a:t>
+            </a:r>
+            <a:r>
+              <a:rPr lang="en-GB" dirty="0" smtClean="0"/>
+              <a:t> med. Hugs </a:t>
+            </a:r>
+            <a:r>
+              <a:rPr lang="nn-NO" dirty="0" smtClean="0"/>
+              <a:t>å byta til denne </a:t>
+            </a:r>
+            <a:r>
+              <a:rPr lang="nn-NO" dirty="0" err="1" smtClean="0"/>
+              <a:t>branchen</a:t>
+            </a:r>
+            <a:r>
+              <a:rPr lang="nn-NO" dirty="0" smtClean="0"/>
+              <a:t>.</a:t>
             </a:r>
           </a:p>
           <a:p>
@@ -3869,6 +3876,24 @@
             </a:pPr>
             <a:r>
               <a:rPr lang="nn-NO" dirty="0" smtClean="0"/>
+              <a:t>Jobb i veg. Du kan no ta </a:t>
+            </a:r>
+            <a:r>
+              <a:rPr lang="nn-NO" dirty="0" err="1" smtClean="0"/>
+              <a:t>commit</a:t>
+            </a:r>
+            <a:r>
+              <a:rPr lang="nn-NO" dirty="0" smtClean="0"/>
+              <a:t> så ofte du vil, sidan du berre gjer dette lokalt hos deg.</a:t>
+            </a:r>
+          </a:p>
+          <a:p>
+            <a:pPr marL="514350" indent="-514350">
+              <a:buFont typeface="+mj-lt"/>
+              <a:buAutoNum type="arabicPeriod"/>
+            </a:pPr>
+            <a:r>
+              <a:rPr lang="nn-NO" dirty="0" smtClean="0"/>
               <a:t>Når du er nøgd gjer du følgjande:</a:t>
             </a:r>
           </a:p>
@@ -3897,7 +3922,63 @@
             </a:pPr>
             <a:r>
               <a:rPr lang="nn-NO" dirty="0" smtClean="0"/>
-              <a:t>Pull frå sentral master, så du får alle oppdateringar.</a:t>
+              <a:t>Pull frå </a:t>
+            </a:r>
+            <a:r>
+              <a:rPr lang="nn-NO" dirty="0" err="1" smtClean="0"/>
+              <a:t>upstream</a:t>
+            </a:r>
+            <a:r>
+              <a:rPr lang="nn-NO" dirty="0" smtClean="0"/>
+              <a:t>, så du får alle oppdateringar</a:t>
+            </a:r>
+            <a:r>
+              <a:rPr lang="nn-NO" dirty="0"/>
+              <a:t>. </a:t>
+            </a:r>
+            <a:r>
+              <a:rPr lang="nn-NO" dirty="0" smtClean="0"/>
+              <a:t>(Dette </a:t>
+            </a:r>
+            <a:r>
+              <a:rPr lang="nn-NO" dirty="0" err="1" smtClean="0"/>
+              <a:t>gjøres</a:t>
+            </a:r>
+            <a:r>
+              <a:rPr lang="nn-NO" dirty="0" smtClean="0"/>
+              <a:t> ved å lage en </a:t>
+            </a:r>
+            <a:r>
+              <a:rPr lang="nn-NO" dirty="0" err="1" smtClean="0"/>
+              <a:t>upstream</a:t>
+            </a:r>
+            <a:r>
+              <a:rPr lang="nn-NO" dirty="0" smtClean="0"/>
+              <a:t> under pull (</a:t>
+            </a:r>
+            <a:r>
+              <a:rPr lang="nn-NO" dirty="0" err="1" smtClean="0"/>
+              <a:t>Manage</a:t>
+            </a:r>
+            <a:r>
+              <a:rPr lang="nn-NO" dirty="0" smtClean="0"/>
+              <a:t> Remotes) og bruke  </a:t>
+            </a:r>
+            <a:r>
+              <a:rPr lang="nn-NO" dirty="0" err="1" smtClean="0"/>
+              <a:t>adressen</a:t>
+            </a:r>
+            <a:r>
+              <a:rPr lang="nn-NO" dirty="0" smtClean="0"/>
+              <a:t> https</a:t>
+            </a:r>
+            <a:r>
+              <a:rPr lang="nn-NO" dirty="0"/>
+              <a:t>://</a:t>
+            </a:r>
+            <a:r>
+              <a:rPr lang="nn-NO" dirty="0" smtClean="0"/>
+              <a:t>github.com/CRAVA/crava.git)</a:t>
             </a:r>
           </a:p>
           <a:p>
@@ -3965,6 +4046,29 @@
               <a:rPr lang="nn-NO" dirty="0" smtClean="0"/>
               <a:t> din.</a:t>
             </a:r>
+          </a:p>
+          <a:p>
+            <a:pPr marL="914400" lvl="1" indent="-514350">
+              <a:buFont typeface="+mj-lt"/>
+              <a:buAutoNum type="arabicPeriod"/>
+            </a:pPr>
+            <a:r>
+              <a:rPr lang="nn-NO" dirty="0" smtClean="0"/>
+              <a:t>Lag en pull </a:t>
+            </a:r>
+            <a:r>
+              <a:rPr lang="nn-NO" dirty="0" err="1" smtClean="0"/>
+              <a:t>request</a:t>
+            </a:r>
+            <a:r>
+              <a:rPr lang="nn-NO" dirty="0" smtClean="0"/>
+              <a:t> under din bruker på </a:t>
+            </a:r>
+            <a:r>
+              <a:rPr lang="nn-NO" dirty="0" err="1" smtClean="0"/>
+              <a:t>GitHub</a:t>
+            </a:r>
+            <a:endParaRPr lang="nn-NO" dirty="0" smtClean="0"/>
           </a:p>
           <a:p>
             <a:pPr marL="514350" indent="-514350">

</xml_diff>